<commit_message>
Moved the art assets to a folder called assets
</commit_message>
<xml_diff>
--- a/6028_Graph_1/D2D/W04-a (Debug visualization items)/Making a debug item thing.pptx
+++ b/6028_Graph_1/D2D/W04-a (Debug visualization items)/Making a debug item thing.pptx
@@ -6,6 +6,8 @@
   </p:sldMasterIdLst>
   <p:sldIdLst>
     <p:sldId id="256" r:id="rId2"/>
+    <p:sldId id="257" r:id="rId3"/>
+    <p:sldId id="258" r:id="rId4"/>
   </p:sldIdLst>
   <p:sldSz cx="12192000" cy="6858000"/>
   <p:notesSz cx="6858000" cy="9144000"/>
@@ -3444,6 +3446,265 @@
 </p:sld>
 </file>
 
+<file path=ppt/slides/slide2.xml><?xml version="1.0" encoding="utf-8"?>
+<p:sld xmlns:a="http://schemas.openxmlformats.org/drawingml/2006/main" xmlns:r="http://schemas.openxmlformats.org/officeDocument/2006/relationships" xmlns:p="http://schemas.openxmlformats.org/presentationml/2006/main">
+  <p:cSld>
+    <p:spTree>
+      <p:nvGrpSpPr>
+        <p:cNvPr id="1" name=""/>
+        <p:cNvGrpSpPr/>
+        <p:nvPr/>
+      </p:nvGrpSpPr>
+      <p:grpSpPr>
+        <a:xfrm>
+          <a:off x="0" y="0"/>
+          <a:ext cx="0" cy="0"/>
+          <a:chOff x="0" y="0"/>
+          <a:chExt cx="0" cy="0"/>
+        </a:xfrm>
+      </p:grpSpPr>
+      <p:sp>
+        <p:nvSpPr>
+          <p:cNvPr id="4" name="Title 3">
+            <a:extLst>
+              <a:ext uri="{FF2B5EF4-FFF2-40B4-BE49-F238E27FC236}">
+                <a16:creationId xmlns:a16="http://schemas.microsoft.com/office/drawing/2014/main" id="{EC058974-4F66-9719-D115-9AD6FA449795}"/>
+              </a:ext>
+            </a:extLst>
+          </p:cNvPr>
+          <p:cNvSpPr>
+            <a:spLocks noGrp="1"/>
+          </p:cNvSpPr>
+          <p:nvPr>
+            <p:ph type="title"/>
+          </p:nvPr>
+        </p:nvSpPr>
+        <p:spPr/>
+        <p:txBody>
+          <a:bodyPr/>
+          <a:lstStyle/>
+          <a:p>
+            <a:r>
+              <a:rPr lang="en-CA" dirty="0"/>
+              <a:t>Steps, part 1</a:t>
+            </a:r>
+          </a:p>
+        </p:txBody>
+      </p:sp>
+      <p:sp>
+        <p:nvSpPr>
+          <p:cNvPr id="5" name="Content Placeholder 4">
+            <a:extLst>
+              <a:ext uri="{FF2B5EF4-FFF2-40B4-BE49-F238E27FC236}">
+                <a16:creationId xmlns:a16="http://schemas.microsoft.com/office/drawing/2014/main" id="{2A4F00DC-4FC9-BEF2-0EB0-F9B370D0A389}"/>
+              </a:ext>
+            </a:extLst>
+          </p:cNvPr>
+          <p:cNvSpPr>
+            <a:spLocks noGrp="1"/>
+          </p:cNvSpPr>
+          <p:nvPr>
+            <p:ph idx="1"/>
+          </p:nvPr>
+        </p:nvSpPr>
+        <p:spPr>
+          <a:xfrm>
+            <a:off x="838200" y="1514168"/>
+            <a:ext cx="10515600" cy="4662795"/>
+          </a:xfrm>
+        </p:spPr>
+        <p:txBody>
+          <a:bodyPr/>
+          <a:lstStyle/>
+          <a:p>
+            <a:r>
+              <a:rPr lang="en-CA" dirty="0"/>
+              <a:t>Figure out a shader that only draw non-lit object</a:t>
+            </a:r>
+          </a:p>
+          <a:p>
+            <a:pPr lvl="1"/>
+            <a:r>
+              <a:rPr lang="en-CA" dirty="0"/>
+              <a:t>Could be wire-frame or not</a:t>
+            </a:r>
+          </a:p>
+          <a:p>
+            <a:r>
+              <a:rPr lang="en-CA" dirty="0"/>
+              <a:t>Add a class that holds a list of debug objects to draw this frame</a:t>
+            </a:r>
+          </a:p>
+          <a:p>
+            <a:pPr lvl="1"/>
+            <a:r>
+              <a:rPr lang="en-CA" dirty="0"/>
+              <a:t>Each object can have: </a:t>
+            </a:r>
+          </a:p>
+          <a:p>
+            <a:pPr lvl="2"/>
+            <a:r>
+              <a:rPr lang="en-CA" dirty="0"/>
+              <a:t>Draw for 1 frame only </a:t>
+            </a:r>
+          </a:p>
+          <a:p>
+            <a:pPr lvl="2"/>
+            <a:r>
+              <a:rPr lang="en-CA" dirty="0"/>
+              <a:t>Draw for ever</a:t>
+            </a:r>
+          </a:p>
+          <a:p>
+            <a:pPr lvl="2"/>
+            <a:r>
+              <a:rPr lang="en-CA" dirty="0"/>
+              <a:t>Draw for a certain amount of time, then disappear</a:t>
+            </a:r>
+          </a:p>
+          <a:p>
+            <a:r>
+              <a:rPr lang="en-CA" dirty="0"/>
+              <a:t>Load these objects into their own VAO + shader combo</a:t>
+            </a:r>
+          </a:p>
+          <a:p>
+            <a:r>
+              <a:rPr lang="en-CA" dirty="0"/>
+              <a:t>Each frame, we go through this list of debug objects and draw then, then delete them if they aren’t needed anymore.</a:t>
+            </a:r>
+          </a:p>
+        </p:txBody>
+      </p:sp>
+    </p:spTree>
+    <p:extLst>
+      <p:ext uri="{BB962C8B-B14F-4D97-AF65-F5344CB8AC3E}">
+        <p14:creationId xmlns:p14="http://schemas.microsoft.com/office/powerpoint/2010/main" val="414727089"/>
+      </p:ext>
+    </p:extLst>
+  </p:cSld>
+  <p:clrMapOvr>
+    <a:masterClrMapping/>
+  </p:clrMapOvr>
+</p:sld>
+</file>
+
+<file path=ppt/slides/slide3.xml><?xml version="1.0" encoding="utf-8"?>
+<p:sld xmlns:a="http://schemas.openxmlformats.org/drawingml/2006/main" xmlns:r="http://schemas.openxmlformats.org/officeDocument/2006/relationships" xmlns:p="http://schemas.openxmlformats.org/presentationml/2006/main">
+  <p:cSld>
+    <p:spTree>
+      <p:nvGrpSpPr>
+        <p:cNvPr id="1" name=""/>
+        <p:cNvGrpSpPr/>
+        <p:nvPr/>
+      </p:nvGrpSpPr>
+      <p:grpSpPr>
+        <a:xfrm>
+          <a:off x="0" y="0"/>
+          <a:ext cx="0" cy="0"/>
+          <a:chOff x="0" y="0"/>
+          <a:chExt cx="0" cy="0"/>
+        </a:xfrm>
+      </p:grpSpPr>
+      <p:sp>
+        <p:nvSpPr>
+          <p:cNvPr id="4" name="Title 3">
+            <a:extLst>
+              <a:ext uri="{FF2B5EF4-FFF2-40B4-BE49-F238E27FC236}">
+                <a16:creationId xmlns:a16="http://schemas.microsoft.com/office/drawing/2014/main" id="{EC058974-4F66-9719-D115-9AD6FA449795}"/>
+              </a:ext>
+            </a:extLst>
+          </p:cNvPr>
+          <p:cNvSpPr>
+            <a:spLocks noGrp="1"/>
+          </p:cNvSpPr>
+          <p:nvPr>
+            <p:ph type="title"/>
+          </p:nvPr>
+        </p:nvSpPr>
+        <p:spPr/>
+        <p:txBody>
+          <a:bodyPr/>
+          <a:lstStyle/>
+          <a:p>
+            <a:r>
+              <a:rPr lang="en-CA" dirty="0"/>
+              <a:t>Steps, part 2 : any dynamic lines</a:t>
+            </a:r>
+          </a:p>
+        </p:txBody>
+      </p:sp>
+      <p:sp>
+        <p:nvSpPr>
+          <p:cNvPr id="5" name="Content Placeholder 4">
+            <a:extLst>
+              <a:ext uri="{FF2B5EF4-FFF2-40B4-BE49-F238E27FC236}">
+                <a16:creationId xmlns:a16="http://schemas.microsoft.com/office/drawing/2014/main" id="{2A4F00DC-4FC9-BEF2-0EB0-F9B370D0A389}"/>
+              </a:ext>
+            </a:extLst>
+          </p:cNvPr>
+          <p:cNvSpPr>
+            <a:spLocks noGrp="1"/>
+          </p:cNvSpPr>
+          <p:nvPr>
+            <p:ph idx="1"/>
+          </p:nvPr>
+        </p:nvSpPr>
+        <p:spPr>
+          <a:xfrm>
+            <a:off x="838200" y="1514168"/>
+            <a:ext cx="10515600" cy="4662795"/>
+          </a:xfrm>
+        </p:spPr>
+        <p:txBody>
+          <a:bodyPr/>
+          <a:lstStyle/>
+          <a:p>
+            <a:r>
+              <a:rPr lang="en-CA" dirty="0"/>
+              <a:t>Make a large vertex buffer (NOT an element buffer) that’s large enough to draw the maximum number of lines.</a:t>
+            </a:r>
+          </a:p>
+          <a:p>
+            <a:r>
+              <a:rPr lang="en-CA" dirty="0"/>
+              <a:t>Keep the original C++/CPU side array.</a:t>
+            </a:r>
+          </a:p>
+          <a:p>
+            <a:r>
+              <a:rPr lang="en-CA" dirty="0"/>
+              <a:t>Load the lines into this C++/CPU side array.</a:t>
+            </a:r>
+          </a:p>
+          <a:p>
+            <a:r>
+              <a:rPr lang="en-CA" dirty="0"/>
+              <a:t>Each frame, update the buffer on the GPU side.</a:t>
+            </a:r>
+          </a:p>
+          <a:p>
+            <a:r>
+              <a:rPr lang="en-CA" dirty="0"/>
+              <a:t>Tell it to draw X number of lines that are in that buffer</a:t>
+            </a:r>
+          </a:p>
+        </p:txBody>
+      </p:sp>
+    </p:spTree>
+    <p:extLst>
+      <p:ext uri="{BB962C8B-B14F-4D97-AF65-F5344CB8AC3E}">
+        <p14:creationId xmlns:p14="http://schemas.microsoft.com/office/powerpoint/2010/main" val="1749041276"/>
+      </p:ext>
+    </p:extLst>
+  </p:cSld>
+  <p:clrMapOvr>
+    <a:masterClrMapping/>
+  </p:clrMapOvr>
+</p:sld>
+</file>
+
 <file path=ppt/theme/theme1.xml><?xml version="1.0" encoding="utf-8"?>
 <a:theme xmlns:a="http://schemas.openxmlformats.org/drawingml/2006/main" name="Office Theme">
   <a:themeElements>

</xml_diff>